<commit_message>
dalsi reseni, obrazek gui testovani
</commit_message>
<xml_diff>
--- a/prezentace_mikulik.pptx
+++ b/prezentace_mikulik.pptx
@@ -5,7 +5,7 @@
     <p:sldMasterId id="2147483648" r:id="rId1"/>
   </p:sldMasterIdLst>
   <p:notesMasterIdLst>
-    <p:notesMasterId r:id="rId14"/>
+    <p:notesMasterId r:id="rId18"/>
   </p:notesMasterIdLst>
   <p:sldIdLst>
     <p:sldId id="256" r:id="rId2"/>
@@ -14,12 +14,16 @@
     <p:sldId id="283" r:id="rId5"/>
     <p:sldId id="280" r:id="rId6"/>
     <p:sldId id="284" r:id="rId7"/>
-    <p:sldId id="289" r:id="rId8"/>
-    <p:sldId id="285" r:id="rId9"/>
-    <p:sldId id="286" r:id="rId10"/>
-    <p:sldId id="258" r:id="rId11"/>
-    <p:sldId id="287" r:id="rId12"/>
-    <p:sldId id="288" r:id="rId13"/>
+    <p:sldId id="290" r:id="rId8"/>
+    <p:sldId id="293" r:id="rId9"/>
+    <p:sldId id="291" r:id="rId10"/>
+    <p:sldId id="289" r:id="rId11"/>
+    <p:sldId id="292" r:id="rId12"/>
+    <p:sldId id="285" r:id="rId13"/>
+    <p:sldId id="286" r:id="rId14"/>
+    <p:sldId id="258" r:id="rId15"/>
+    <p:sldId id="287" r:id="rId16"/>
+    <p:sldId id="288" r:id="rId17"/>
   </p:sldIdLst>
   <p:sldSz cx="9144000" cy="6858000" type="screen4x3"/>
   <p:notesSz cx="6858000" cy="9144000"/>
@@ -238,7 +242,7 @@
           <a:p>
             <a:fld id="{E5AE9AC0-91B4-4824-A88B-C5B54BCCFFB7}" type="datetimeFigureOut">
               <a:rPr lang="cs-CZ" smtClean="0"/>
-              <a:t>05.01.2021</a:t>
+              <a:t>07.01.2021</a:t>
             </a:fld>
             <a:endParaRPr lang="cs-CZ"/>
           </a:p>
@@ -506,6 +510,174 @@
 </p:notesMaster>
 </file>
 
+<file path=ppt/notesSlides/notesSlide1.xml><?xml version="1.0" encoding="utf-8"?>
+<p:notes xmlns:a="http://schemas.openxmlformats.org/drawingml/2006/main" xmlns:r="http://schemas.openxmlformats.org/officeDocument/2006/relationships" xmlns:p="http://schemas.openxmlformats.org/presentationml/2006/main">
+  <p:cSld>
+    <p:spTree>
+      <p:nvGrpSpPr>
+        <p:cNvPr id="1" name=""/>
+        <p:cNvGrpSpPr/>
+        <p:nvPr/>
+      </p:nvGrpSpPr>
+      <p:grpSpPr>
+        <a:xfrm>
+          <a:off x="0" y="0"/>
+          <a:ext cx="0" cy="0"/>
+          <a:chOff x="0" y="0"/>
+          <a:chExt cx="0" cy="0"/>
+        </a:xfrm>
+      </p:grpSpPr>
+      <p:sp>
+        <p:nvSpPr>
+          <p:cNvPr id="2" name="Zástupný symbol pro obrázek snímku 1"/>
+          <p:cNvSpPr>
+            <a:spLocks noGrp="1" noRot="1" noChangeAspect="1"/>
+          </p:cNvSpPr>
+          <p:nvPr>
+            <p:ph type="sldImg"/>
+          </p:nvPr>
+        </p:nvSpPr>
+        <p:spPr/>
+      </p:sp>
+      <p:sp>
+        <p:nvSpPr>
+          <p:cNvPr id="3" name="Zástupný symbol pro poznámky 2"/>
+          <p:cNvSpPr>
+            <a:spLocks noGrp="1"/>
+          </p:cNvSpPr>
+          <p:nvPr>
+            <p:ph type="body" idx="1"/>
+          </p:nvPr>
+        </p:nvSpPr>
+        <p:spPr/>
+        <p:txBody>
+          <a:bodyPr/>
+          <a:lstStyle/>
+          <a:p>
+            <a:endParaRPr lang="cs-CZ" dirty="0"/>
+          </a:p>
+        </p:txBody>
+      </p:sp>
+      <p:sp>
+        <p:nvSpPr>
+          <p:cNvPr id="4" name="Zástupný symbol pro číslo snímku 3"/>
+          <p:cNvSpPr>
+            <a:spLocks noGrp="1"/>
+          </p:cNvSpPr>
+          <p:nvPr>
+            <p:ph type="sldNum" sz="quarter" idx="5"/>
+          </p:nvPr>
+        </p:nvSpPr>
+        <p:spPr/>
+        <p:txBody>
+          <a:bodyPr/>
+          <a:lstStyle/>
+          <a:p>
+            <a:fld id="{5877EF71-8149-4265-A17D-0378E96390C5}" type="slidenum">
+              <a:rPr lang="cs-CZ" smtClean="0"/>
+              <a:t>7</a:t>
+            </a:fld>
+            <a:endParaRPr lang="cs-CZ"/>
+          </a:p>
+        </p:txBody>
+      </p:sp>
+    </p:spTree>
+    <p:extLst>
+      <p:ext uri="{BB962C8B-B14F-4D97-AF65-F5344CB8AC3E}">
+        <p14:creationId xmlns:p14="http://schemas.microsoft.com/office/powerpoint/2010/main" val="996239128"/>
+      </p:ext>
+    </p:extLst>
+  </p:cSld>
+  <p:clrMapOvr>
+    <a:masterClrMapping/>
+  </p:clrMapOvr>
+</p:notes>
+</file>
+
+<file path=ppt/notesSlides/notesSlide2.xml><?xml version="1.0" encoding="utf-8"?>
+<p:notes xmlns:a="http://schemas.openxmlformats.org/drawingml/2006/main" xmlns:r="http://schemas.openxmlformats.org/officeDocument/2006/relationships" xmlns:p="http://schemas.openxmlformats.org/presentationml/2006/main">
+  <p:cSld>
+    <p:spTree>
+      <p:nvGrpSpPr>
+        <p:cNvPr id="1" name=""/>
+        <p:cNvGrpSpPr/>
+        <p:nvPr/>
+      </p:nvGrpSpPr>
+      <p:grpSpPr>
+        <a:xfrm>
+          <a:off x="0" y="0"/>
+          <a:ext cx="0" cy="0"/>
+          <a:chOff x="0" y="0"/>
+          <a:chExt cx="0" cy="0"/>
+        </a:xfrm>
+      </p:grpSpPr>
+      <p:sp>
+        <p:nvSpPr>
+          <p:cNvPr id="2" name="Zástupný symbol pro obrázek snímku 1"/>
+          <p:cNvSpPr>
+            <a:spLocks noGrp="1" noRot="1" noChangeAspect="1"/>
+          </p:cNvSpPr>
+          <p:nvPr>
+            <p:ph type="sldImg"/>
+          </p:nvPr>
+        </p:nvSpPr>
+        <p:spPr/>
+      </p:sp>
+      <p:sp>
+        <p:nvSpPr>
+          <p:cNvPr id="3" name="Zástupný symbol pro poznámky 2"/>
+          <p:cNvSpPr>
+            <a:spLocks noGrp="1"/>
+          </p:cNvSpPr>
+          <p:nvPr>
+            <p:ph type="body" idx="1"/>
+          </p:nvPr>
+        </p:nvSpPr>
+        <p:spPr/>
+        <p:txBody>
+          <a:bodyPr/>
+          <a:lstStyle/>
+          <a:p>
+            <a:endParaRPr lang="cs-CZ" dirty="0"/>
+          </a:p>
+        </p:txBody>
+      </p:sp>
+      <p:sp>
+        <p:nvSpPr>
+          <p:cNvPr id="4" name="Zástupný symbol pro číslo snímku 3"/>
+          <p:cNvSpPr>
+            <a:spLocks noGrp="1"/>
+          </p:cNvSpPr>
+          <p:nvPr>
+            <p:ph type="sldNum" sz="quarter" idx="5"/>
+          </p:nvPr>
+        </p:nvSpPr>
+        <p:spPr/>
+        <p:txBody>
+          <a:bodyPr/>
+          <a:lstStyle/>
+          <a:p>
+            <a:fld id="{5877EF71-8149-4265-A17D-0378E96390C5}" type="slidenum">
+              <a:rPr lang="cs-CZ" smtClean="0"/>
+              <a:t>10</a:t>
+            </a:fld>
+            <a:endParaRPr lang="cs-CZ"/>
+          </a:p>
+        </p:txBody>
+      </p:sp>
+    </p:spTree>
+    <p:extLst>
+      <p:ext uri="{BB962C8B-B14F-4D97-AF65-F5344CB8AC3E}">
+        <p14:creationId xmlns:p14="http://schemas.microsoft.com/office/powerpoint/2010/main" val="3247774064"/>
+      </p:ext>
+    </p:extLst>
+  </p:cSld>
+  <p:clrMapOvr>
+    <a:masterClrMapping/>
+  </p:clrMapOvr>
+</p:notes>
+</file>
+
 <file path=ppt/slideLayouts/slideLayout1.xml><?xml version="1.0" encoding="utf-8"?>
 <p:sldLayout xmlns:a="http://schemas.openxmlformats.org/drawingml/2006/main" xmlns:r="http://schemas.openxmlformats.org/officeDocument/2006/relationships" xmlns:p="http://schemas.openxmlformats.org/presentationml/2006/main" type="title" preserve="1">
   <p:cSld name="Úvodní snímek">
@@ -724,7 +896,7 @@
             </a:pPr>
             <a:fld id="{FA73DBD0-4041-441D-88E6-1BDE07127113}" type="datetime1">
               <a:rPr lang="cs-CZ" smtClean="0"/>
-              <a:t>05.01.2021</a:t>
+              <a:t>07.01.2021</a:t>
             </a:fld>
             <a:endParaRPr lang="cs-CZ"/>
           </a:p>
@@ -989,7 +1161,7 @@
             </a:pPr>
             <a:fld id="{22E7FC96-EAE3-41B5-8484-4B59543BC2E6}" type="datetime1">
               <a:rPr lang="cs-CZ" smtClean="0"/>
-              <a:t>05.01.2021</a:t>
+              <a:t>07.01.2021</a:t>
             </a:fld>
             <a:endParaRPr lang="cs-CZ" dirty="0"/>
           </a:p>
@@ -1255,7 +1427,7 @@
             </a:pPr>
             <a:fld id="{2F04448D-71A4-4B6D-B9DB-54BB7AF207BA}" type="datetime1">
               <a:rPr lang="cs-CZ" smtClean="0"/>
-              <a:t>05.01.2021</a:t>
+              <a:t>07.01.2021</a:t>
             </a:fld>
             <a:endParaRPr lang="cs-CZ" dirty="0"/>
           </a:p>
@@ -1511,7 +1683,7 @@
             </a:pPr>
             <a:fld id="{7DD473FF-DF4E-4043-A1B9-DBD584DB4746}" type="datetime1">
               <a:rPr lang="cs-CZ" smtClean="0"/>
-              <a:t>05.01.2021</a:t>
+              <a:t>07.01.2021</a:t>
             </a:fld>
             <a:endParaRPr lang="cs-CZ" dirty="0"/>
           </a:p>
@@ -1786,7 +1958,7 @@
             </a:pPr>
             <a:fld id="{00608D6E-9B35-47EF-9A97-18052E0AAFE1}" type="datetime1">
               <a:rPr lang="cs-CZ" smtClean="0"/>
-              <a:t>05.01.2021</a:t>
+              <a:t>07.01.2021</a:t>
             </a:fld>
             <a:endParaRPr lang="cs-CZ" dirty="0"/>
           </a:p>
@@ -2184,7 +2356,7 @@
             </a:pPr>
             <a:fld id="{A3D9D016-A836-4995-9767-6E40F7F84F5B}" type="datetime1">
               <a:rPr lang="cs-CZ" smtClean="0"/>
-              <a:t>05.01.2021</a:t>
+              <a:t>07.01.2021</a:t>
             </a:fld>
             <a:endParaRPr lang="cs-CZ" dirty="0"/>
           </a:p>
@@ -2710,7 +2882,7 @@
             </a:pPr>
             <a:fld id="{A891B04F-608B-47B1-B158-920779C7C596}" type="datetime1">
               <a:rPr lang="cs-CZ" smtClean="0"/>
-              <a:t>05.01.2021</a:t>
+              <a:t>07.01.2021</a:t>
             </a:fld>
             <a:endParaRPr lang="cs-CZ" dirty="0"/>
           </a:p>
@@ -2868,7 +3040,7 @@
             </a:pPr>
             <a:fld id="{61D0F01E-2AAE-4199-88A5-DA519A106AD5}" type="datetime1">
               <a:rPr lang="cs-CZ" smtClean="0"/>
-              <a:t>05.01.2021</a:t>
+              <a:t>07.01.2021</a:t>
             </a:fld>
             <a:endParaRPr lang="cs-CZ" dirty="0"/>
           </a:p>
@@ -2987,7 +3159,7 @@
             </a:pPr>
             <a:fld id="{2C0EE0C1-D8D5-4B23-8B98-69900E67ADF0}" type="datetime1">
               <a:rPr lang="cs-CZ" smtClean="0"/>
-              <a:t>05.01.2021</a:t>
+              <a:t>07.01.2021</a:t>
             </a:fld>
             <a:endParaRPr lang="cs-CZ" dirty="0"/>
           </a:p>
@@ -3248,7 +3420,7 @@
             </a:pPr>
             <a:fld id="{897C5534-677A-478A-872E-3888978E6C71}" type="datetime1">
               <a:rPr lang="cs-CZ" smtClean="0"/>
-              <a:t>05.01.2021</a:t>
+              <a:t>07.01.2021</a:t>
             </a:fld>
             <a:endParaRPr lang="cs-CZ"/>
           </a:p>
@@ -3538,7 +3710,7 @@
             </a:pPr>
             <a:fld id="{C22F850B-C590-41F7-824A-91113940C13D}" type="datetime1">
               <a:rPr lang="cs-CZ" smtClean="0"/>
-              <a:t>05.01.2021</a:t>
+              <a:t>07.01.2021</a:t>
             </a:fld>
             <a:endParaRPr lang="cs-CZ" dirty="0"/>
           </a:p>
@@ -3835,7 +4007,7 @@
             </a:pPr>
             <a:fld id="{ACA5497F-27AB-4133-A370-9F17F6AFD10B}" type="datetime1">
               <a:rPr lang="cs-CZ" smtClean="0"/>
-              <a:t>05.01.2021</a:t>
+              <a:t>07.01.2021</a:t>
             </a:fld>
             <a:endParaRPr lang="cs-CZ" dirty="0"/>
           </a:p>
@@ -4525,93 +4697,744 @@
       </p:grpSpPr>
       <p:sp>
         <p:nvSpPr>
-          <p:cNvPr id="3" name="Zástupný symbol pro obsah 2"/>
-          <p:cNvSpPr>
-            <a:spLocks noGrp="1"/>
-          </p:cNvSpPr>
-          <p:nvPr>
-            <p:ph idx="1"/>
-          </p:nvPr>
-        </p:nvSpPr>
-        <p:spPr>
-          <a:xfrm>
-            <a:off x="1691680" y="2204864"/>
-            <a:ext cx="7283152" cy="5434013"/>
-          </a:xfrm>
-        </p:spPr>
-        <p:txBody>
-          <a:bodyPr rtlCol="0">
-            <a:normAutofit/>
-          </a:bodyPr>
+          <p:cNvPr id="2" name="Nadpis 1">
+            <a:extLst>
+              <a:ext uri="{FF2B5EF4-FFF2-40B4-BE49-F238E27FC236}">
+                <a16:creationId xmlns:a16="http://schemas.microsoft.com/office/drawing/2014/main" id="{A54F850E-FBE5-4CBE-9D72-1B28E793C3DC}"/>
+              </a:ext>
+            </a:extLst>
+          </p:cNvPr>
+          <p:cNvSpPr>
+            <a:spLocks noGrp="1"/>
+          </p:cNvSpPr>
+          <p:nvPr>
+            <p:ph type="title"/>
+          </p:nvPr>
+        </p:nvSpPr>
+        <p:spPr/>
+        <p:txBody>
+          <a:bodyPr/>
           <a:lstStyle/>
           <a:p>
-            <a:pPr eaLnBrk="1" fontAlgn="auto" hangingPunct="1">
-              <a:spcAft>
-                <a:spcPts val="0"/>
-              </a:spcAft>
+            <a:r>
+              <a:rPr lang="cs-CZ" dirty="0"/>
+              <a:t>Představení aplikace</a:t>
+            </a:r>
+          </a:p>
+        </p:txBody>
+      </p:sp>
+      <p:sp>
+        <p:nvSpPr>
+          <p:cNvPr id="3" name="Zástupný obsah 2">
+            <a:extLst>
+              <a:ext uri="{FF2B5EF4-FFF2-40B4-BE49-F238E27FC236}">
+                <a16:creationId xmlns:a16="http://schemas.microsoft.com/office/drawing/2014/main" id="{8F397D2B-8121-4EB3-AB24-D53988BE96CC}"/>
+              </a:ext>
+            </a:extLst>
+          </p:cNvPr>
+          <p:cNvSpPr>
+            <a:spLocks noGrp="1"/>
+          </p:cNvSpPr>
+          <p:nvPr>
+            <p:ph sz="quarter" idx="13"/>
+          </p:nvPr>
+        </p:nvSpPr>
+        <p:spPr/>
+        <p:txBody>
+          <a:bodyPr/>
+          <a:lstStyle/>
+          <a:p>
+            <a:r>
+              <a:rPr lang="cs-CZ" dirty="0"/>
+              <a:t>Použití fuzzy logiky</a:t>
+            </a:r>
+          </a:p>
+          <a:p>
+            <a:pPr lvl="1"/>
+            <a:r>
+              <a:rPr lang="cs-CZ" dirty="0"/>
+              <a:t>Jízda za sebou</a:t>
+            </a:r>
+          </a:p>
+          <a:p>
+            <a:pPr lvl="1"/>
+            <a:r>
+              <a:rPr lang="cs-CZ" dirty="0"/>
+              <a:t>Určení přednosti</a:t>
+            </a:r>
+          </a:p>
+          <a:p>
+            <a:r>
+              <a:rPr lang="cs-CZ" dirty="0"/>
+              <a:t>Použitá logika</a:t>
+            </a:r>
+          </a:p>
+          <a:p>
+            <a:pPr lvl="1"/>
+            <a:r>
+              <a:rPr lang="cs-CZ" dirty="0"/>
+              <a:t>DNF</a:t>
+            </a:r>
+          </a:p>
+          <a:p>
+            <a:pPr lvl="1"/>
+            <a:r>
+              <a:rPr lang="cs-CZ" dirty="0"/>
+              <a:t>COG</a:t>
+            </a:r>
+          </a:p>
+        </p:txBody>
+      </p:sp>
+      <p:sp>
+        <p:nvSpPr>
+          <p:cNvPr id="4" name="Zástupný symbol pro číslo snímku 3">
+            <a:extLst>
+              <a:ext uri="{FF2B5EF4-FFF2-40B4-BE49-F238E27FC236}">
+                <a16:creationId xmlns:a16="http://schemas.microsoft.com/office/drawing/2014/main" id="{6F2356E9-1801-43D2-94DD-FB114B35A0D6}"/>
+              </a:ext>
+            </a:extLst>
+          </p:cNvPr>
+          <p:cNvSpPr>
+            <a:spLocks noGrp="1"/>
+          </p:cNvSpPr>
+          <p:nvPr>
+            <p:ph type="sldNum" sz="quarter" idx="16"/>
+          </p:nvPr>
+        </p:nvSpPr>
+        <p:spPr/>
+        <p:txBody>
+          <a:bodyPr/>
+          <a:lstStyle/>
+          <a:p>
+            <a:pPr>
               <a:defRPr/>
             </a:pPr>
-            <a:endParaRPr lang="cs-CZ" dirty="0"/>
-          </a:p>
-          <a:p>
-            <a:pPr marL="0" indent="0" eaLnBrk="1" fontAlgn="auto" hangingPunct="1">
-              <a:spcAft>
-                <a:spcPts val="0"/>
-              </a:spcAft>
-              <a:buFont typeface="Arial" panose="020B0604020202020204" pitchFamily="34" charset="0"/>
-              <a:buNone/>
-              <a:defRPr/>
-            </a:pPr>
-            <a:r>
-              <a:rPr lang="cs-CZ" sz="4800" dirty="0">
-                <a:solidFill>
-                  <a:schemeClr val="accent3">
-                    <a:lumMod val="75000"/>
-                  </a:schemeClr>
-                </a:solidFill>
-              </a:rPr>
-              <a:t>Děkuji za pozornost.</a:t>
-            </a:r>
-            <a:endParaRPr lang="cs-CZ" sz="1400" dirty="0">
-              <a:solidFill>
-                <a:schemeClr val="accent3">
-                  <a:lumMod val="75000"/>
-                </a:schemeClr>
-              </a:solidFill>
-            </a:endParaRPr>
-          </a:p>
-        </p:txBody>
-      </p:sp>
-      <p:sp>
-        <p:nvSpPr>
-          <p:cNvPr id="4" name="Zástupný symbol pro číslo snímku 3"/>
-          <p:cNvSpPr>
-            <a:spLocks noGrp="1"/>
-          </p:cNvSpPr>
-          <p:nvPr>
-            <p:ph type="sldNum" sz="quarter" idx="12"/>
-          </p:nvPr>
-        </p:nvSpPr>
-        <p:spPr/>
-        <p:txBody>
-          <a:bodyPr/>
-          <a:lstStyle/>
-          <a:p>
-            <a:pPr>
-              <a:defRPr/>
-            </a:pPr>
-            <a:fld id="{97167BA6-C5C0-4AE9-8563-CCC31371C1AC}" type="slidenum">
+            <a:fld id="{56CDC768-3DE3-479D-89FC-7F989B177BF5}" type="slidenum">
               <a:rPr lang="cs-CZ" smtClean="0"/>
               <a:pPr>
                 <a:defRPr/>
               </a:pPr>
               <a:t>10</a:t>
             </a:fld>
-            <a:endParaRPr lang="cs-CZ"/>
-          </a:p>
-        </p:txBody>
-      </p:sp>
+            <a:endParaRPr lang="cs-CZ" dirty="0"/>
+          </a:p>
+        </p:txBody>
+      </p:sp>
+      <mc:AlternateContent xmlns:mc="http://schemas.openxmlformats.org/markup-compatibility/2006" xmlns:a14="http://schemas.microsoft.com/office/drawing/2010/main">
+        <mc:Choice Requires="a14">
+          <p:sp>
+            <p:nvSpPr>
+              <p:cNvPr id="7" name="Obdélník 6">
+                <a:extLst>
+                  <a:ext uri="{FF2B5EF4-FFF2-40B4-BE49-F238E27FC236}">
+                    <a16:creationId xmlns:a16="http://schemas.microsoft.com/office/drawing/2014/main" id="{B81EB124-A631-4961-9B0A-C69EA76C1771}"/>
+                  </a:ext>
+                </a:extLst>
+              </p:cNvPr>
+              <p:cNvSpPr/>
+              <p:nvPr/>
+            </p:nvSpPr>
+            <p:spPr>
+              <a:xfrm>
+                <a:off x="3707904" y="4457257"/>
+                <a:ext cx="2771784" cy="699935"/>
+              </a:xfrm>
+              <a:prstGeom prst="rect">
+                <a:avLst/>
+              </a:prstGeom>
+            </p:spPr>
+            <p:txBody>
+              <a:bodyPr wrap="none">
+                <a:spAutoFit/>
+              </a:bodyPr>
+              <a:lstStyle/>
+              <a:p>
+                <a:pPr/>
+                <a14:m>
+                  <m:oMathPara xmlns:m="http://schemas.openxmlformats.org/officeDocument/2006/math">
+                    <m:oMathParaPr>
+                      <m:jc m:val="centerGroup"/>
+                    </m:oMathParaPr>
+                    <m:oMath xmlns:m="http://schemas.openxmlformats.org/officeDocument/2006/math">
+                      <m:r>
+                        <a:rPr lang="cs-CZ" i="1">
+                          <a:latin typeface="Cambria Math" panose="02040503050406030204" pitchFamily="18" charset="0"/>
+                        </a:rPr>
+                        <m:t>𝐶𝑂𝐺</m:t>
+                      </m:r>
+                      <m:d>
+                        <m:dPr>
+                          <m:ctrlPr>
+                            <a:rPr lang="cs-CZ" i="1">
+                              <a:latin typeface="Cambria Math" panose="02040503050406030204" pitchFamily="18" charset="0"/>
+                            </a:rPr>
+                          </m:ctrlPr>
+                        </m:dPr>
+                        <m:e>
+                          <m:r>
+                            <a:rPr lang="cs-CZ" i="1">
+                              <a:latin typeface="Cambria Math" panose="02040503050406030204" pitchFamily="18" charset="0"/>
+                            </a:rPr>
+                            <m:t>𝐴</m:t>
+                          </m:r>
+                        </m:e>
+                      </m:d>
+                      <m:r>
+                        <a:rPr lang="cs-CZ" i="0">
+                          <a:latin typeface="Cambria Math" panose="02040503050406030204" pitchFamily="18" charset="0"/>
+                        </a:rPr>
+                        <m:t>=</m:t>
+                      </m:r>
+                      <m:f>
+                        <m:fPr>
+                          <m:ctrlPr>
+                            <a:rPr lang="cs-CZ" i="1">
+                              <a:latin typeface="Cambria Math" panose="02040503050406030204" pitchFamily="18" charset="0"/>
+                            </a:rPr>
+                          </m:ctrlPr>
+                        </m:fPr>
+                        <m:num>
+                          <m:nary>
+                            <m:naryPr>
+                              <m:chr m:val="∑"/>
+                              <m:limLoc m:val="undOvr"/>
+                              <m:ctrlPr>
+                                <a:rPr lang="cs-CZ" i="1">
+                                  <a:latin typeface="Cambria Math" panose="02040503050406030204" pitchFamily="18" charset="0"/>
+                                </a:rPr>
+                              </m:ctrlPr>
+                            </m:naryPr>
+                            <m:sub>
+                              <m:r>
+                                <a:rPr lang="cs-CZ" i="1">
+                                  <a:latin typeface="Cambria Math" panose="02040503050406030204" pitchFamily="18" charset="0"/>
+                                </a:rPr>
+                                <m:t>𝑖</m:t>
+                              </m:r>
+                              <m:r>
+                                <a:rPr lang="cs-CZ" i="0">
+                                  <a:latin typeface="Cambria Math" panose="02040503050406030204" pitchFamily="18" charset="0"/>
+                                </a:rPr>
+                                <m:t>=1</m:t>
+                              </m:r>
+                            </m:sub>
+                            <m:sup>
+                              <m:r>
+                                <a:rPr lang="cs-CZ" i="1">
+                                  <a:latin typeface="Cambria Math" panose="02040503050406030204" pitchFamily="18" charset="0"/>
+                                </a:rPr>
+                                <m:t>𝑛</m:t>
+                              </m:r>
+                            </m:sup>
+                            <m:e>
+                              <m:r>
+                                <a:rPr lang="cs-CZ" i="1">
+                                  <a:latin typeface="Cambria Math" panose="02040503050406030204" pitchFamily="18" charset="0"/>
+                                </a:rPr>
+                                <m:t>𝐴</m:t>
+                              </m:r>
+                              <m:d>
+                                <m:dPr>
+                                  <m:ctrlPr>
+                                    <a:rPr lang="cs-CZ" i="1">
+                                      <a:latin typeface="Cambria Math" panose="02040503050406030204" pitchFamily="18" charset="0"/>
+                                    </a:rPr>
+                                  </m:ctrlPr>
+                                </m:dPr>
+                                <m:e>
+                                  <m:sSub>
+                                    <m:sSubPr>
+                                      <m:ctrlPr>
+                                        <a:rPr lang="cs-CZ" i="1">
+                                          <a:latin typeface="Cambria Math" panose="02040503050406030204" pitchFamily="18" charset="0"/>
+                                        </a:rPr>
+                                      </m:ctrlPr>
+                                    </m:sSubPr>
+                                    <m:e>
+                                      <m:r>
+                                        <a:rPr lang="cs-CZ" i="1">
+                                          <a:latin typeface="Cambria Math" panose="02040503050406030204" pitchFamily="18" charset="0"/>
+                                        </a:rPr>
+                                        <m:t>𝑢</m:t>
+                                      </m:r>
+                                    </m:e>
+                                    <m:sub>
+                                      <m:r>
+                                        <a:rPr lang="cs-CZ" i="1">
+                                          <a:latin typeface="Cambria Math" panose="02040503050406030204" pitchFamily="18" charset="0"/>
+                                        </a:rPr>
+                                        <m:t>𝑖</m:t>
+                                      </m:r>
+                                    </m:sub>
+                                  </m:sSub>
+                                </m:e>
+                              </m:d>
+                              <m:r>
+                                <a:rPr lang="cs-CZ" i="0">
+                                  <a:latin typeface="Cambria Math" panose="02040503050406030204" pitchFamily="18" charset="0"/>
+                                </a:rPr>
+                                <m:t>∗</m:t>
+                              </m:r>
+                              <m:sSub>
+                                <m:sSubPr>
+                                  <m:ctrlPr>
+                                    <a:rPr lang="cs-CZ" i="1">
+                                      <a:latin typeface="Cambria Math" panose="02040503050406030204" pitchFamily="18" charset="0"/>
+                                    </a:rPr>
+                                  </m:ctrlPr>
+                                </m:sSubPr>
+                                <m:e>
+                                  <m:r>
+                                    <a:rPr lang="cs-CZ" i="1">
+                                      <a:latin typeface="Cambria Math" panose="02040503050406030204" pitchFamily="18" charset="0"/>
+                                    </a:rPr>
+                                    <m:t>𝑢</m:t>
+                                  </m:r>
+                                </m:e>
+                                <m:sub>
+                                  <m:r>
+                                    <a:rPr lang="cs-CZ" i="1">
+                                      <a:latin typeface="Cambria Math" panose="02040503050406030204" pitchFamily="18" charset="0"/>
+                                    </a:rPr>
+                                    <m:t>𝑖</m:t>
+                                  </m:r>
+                                </m:sub>
+                              </m:sSub>
+                            </m:e>
+                          </m:nary>
+                        </m:num>
+                        <m:den>
+                          <m:nary>
+                            <m:naryPr>
+                              <m:chr m:val="∑"/>
+                              <m:limLoc m:val="undOvr"/>
+                              <m:ctrlPr>
+                                <a:rPr lang="cs-CZ" i="1">
+                                  <a:latin typeface="Cambria Math" panose="02040503050406030204" pitchFamily="18" charset="0"/>
+                                </a:rPr>
+                              </m:ctrlPr>
+                            </m:naryPr>
+                            <m:sub>
+                              <m:r>
+                                <a:rPr lang="cs-CZ" i="1">
+                                  <a:latin typeface="Cambria Math" panose="02040503050406030204" pitchFamily="18" charset="0"/>
+                                </a:rPr>
+                                <m:t>𝑖</m:t>
+                              </m:r>
+                              <m:r>
+                                <a:rPr lang="cs-CZ" i="0">
+                                  <a:latin typeface="Cambria Math" panose="02040503050406030204" pitchFamily="18" charset="0"/>
+                                </a:rPr>
+                                <m:t>=1</m:t>
+                              </m:r>
+                            </m:sub>
+                            <m:sup>
+                              <m:r>
+                                <a:rPr lang="cs-CZ" i="1">
+                                  <a:latin typeface="Cambria Math" panose="02040503050406030204" pitchFamily="18" charset="0"/>
+                                </a:rPr>
+                                <m:t>𝑛</m:t>
+                              </m:r>
+                            </m:sup>
+                            <m:e>
+                              <m:r>
+                                <a:rPr lang="cs-CZ" i="1">
+                                  <a:latin typeface="Cambria Math" panose="02040503050406030204" pitchFamily="18" charset="0"/>
+                                </a:rPr>
+                                <m:t>𝐴</m:t>
+                              </m:r>
+                              <m:d>
+                                <m:dPr>
+                                  <m:ctrlPr>
+                                    <a:rPr lang="cs-CZ" i="1">
+                                      <a:latin typeface="Cambria Math" panose="02040503050406030204" pitchFamily="18" charset="0"/>
+                                    </a:rPr>
+                                  </m:ctrlPr>
+                                </m:dPr>
+                                <m:e>
+                                  <m:sSub>
+                                    <m:sSubPr>
+                                      <m:ctrlPr>
+                                        <a:rPr lang="cs-CZ" i="1">
+                                          <a:latin typeface="Cambria Math" panose="02040503050406030204" pitchFamily="18" charset="0"/>
+                                        </a:rPr>
+                                      </m:ctrlPr>
+                                    </m:sSubPr>
+                                    <m:e>
+                                      <m:r>
+                                        <a:rPr lang="cs-CZ" i="1">
+                                          <a:latin typeface="Cambria Math" panose="02040503050406030204" pitchFamily="18" charset="0"/>
+                                        </a:rPr>
+                                        <m:t>𝑢</m:t>
+                                      </m:r>
+                                    </m:e>
+                                    <m:sub>
+                                      <m:r>
+                                        <a:rPr lang="cs-CZ" i="1">
+                                          <a:latin typeface="Cambria Math" panose="02040503050406030204" pitchFamily="18" charset="0"/>
+                                        </a:rPr>
+                                        <m:t>𝑖</m:t>
+                                      </m:r>
+                                    </m:sub>
+                                  </m:sSub>
+                                </m:e>
+                              </m:d>
+                            </m:e>
+                          </m:nary>
+                        </m:den>
+                      </m:f>
+                    </m:oMath>
+                  </m:oMathPara>
+                </a14:m>
+                <a:endParaRPr lang="cs-CZ" sz="1400" dirty="0"/>
+              </a:p>
+            </p:txBody>
+          </p:sp>
+        </mc:Choice>
+        <mc:Fallback xmlns="">
+          <p:sp>
+            <p:nvSpPr>
+              <p:cNvPr id="7" name="Obdélník 6">
+                <a:extLst>
+                  <a:ext uri="{FF2B5EF4-FFF2-40B4-BE49-F238E27FC236}">
+                    <a16:creationId xmlns:a16="http://schemas.microsoft.com/office/drawing/2014/main" id="{B81EB124-A631-4961-9B0A-C69EA76C1771}"/>
+                  </a:ext>
+                </a:extLst>
+              </p:cNvPr>
+              <p:cNvSpPr>
+                <a:spLocks noRot="1" noChangeAspect="1" noMove="1" noResize="1" noEditPoints="1" noAdjustHandles="1" noChangeArrowheads="1" noChangeShapeType="1" noTextEdit="1"/>
+              </p:cNvSpPr>
+              <p:nvPr/>
+            </p:nvSpPr>
+            <p:spPr>
+              <a:xfrm>
+                <a:off x="3707904" y="4457257"/>
+                <a:ext cx="2771784" cy="699935"/>
+              </a:xfrm>
+              <a:prstGeom prst="rect">
+                <a:avLst/>
+              </a:prstGeom>
+              <a:blipFill>
+                <a:blip r:embed="rId3"/>
+                <a:stretch>
+                  <a:fillRect/>
+                </a:stretch>
+              </a:blipFill>
+            </p:spPr>
+            <p:txBody>
+              <a:bodyPr/>
+              <a:lstStyle/>
+              <a:p>
+                <a:r>
+                  <a:rPr lang="cs-CZ">
+                    <a:noFill/>
+                  </a:rPr>
+                  <a:t> </a:t>
+                </a:r>
+              </a:p>
+            </p:txBody>
+          </p:sp>
+        </mc:Fallback>
+      </mc:AlternateContent>
+      <mc:AlternateContent xmlns:mc="http://schemas.openxmlformats.org/markup-compatibility/2006" xmlns:a14="http://schemas.microsoft.com/office/drawing/2010/main">
+        <mc:Choice Requires="a14">
+          <p:sp>
+            <p:nvSpPr>
+              <p:cNvPr id="8" name="Obdélník 7">
+                <a:extLst>
+                  <a:ext uri="{FF2B5EF4-FFF2-40B4-BE49-F238E27FC236}">
+                    <a16:creationId xmlns:a16="http://schemas.microsoft.com/office/drawing/2014/main" id="{067E6CDB-0A1B-420C-9E7D-CCAC60495719}"/>
+                  </a:ext>
+                </a:extLst>
+              </p:cNvPr>
+              <p:cNvSpPr/>
+              <p:nvPr/>
+            </p:nvSpPr>
+            <p:spPr>
+              <a:xfrm>
+                <a:off x="3707904" y="3520706"/>
+                <a:ext cx="3823596" cy="844398"/>
+              </a:xfrm>
+              <a:prstGeom prst="rect">
+                <a:avLst/>
+              </a:prstGeom>
+            </p:spPr>
+            <p:txBody>
+              <a:bodyPr wrap="square">
+                <a:spAutoFit/>
+              </a:bodyPr>
+              <a:lstStyle/>
+              <a:p>
+                <a:pPr/>
+                <a14:m>
+                  <m:oMathPara xmlns:m="http://schemas.openxmlformats.org/officeDocument/2006/math">
+                    <m:oMathParaPr>
+                      <m:jc m:val="centerGroup"/>
+                    </m:oMathParaPr>
+                    <m:oMath xmlns:m="http://schemas.openxmlformats.org/officeDocument/2006/math">
+                      <m:sSub>
+                        <m:sSubPr>
+                          <m:ctrlPr>
+                            <a:rPr lang="cs-CZ" i="1" smtClean="0">
+                              <a:latin typeface="Cambria Math" panose="02040503050406030204" pitchFamily="18" charset="0"/>
+                            </a:rPr>
+                          </m:ctrlPr>
+                        </m:sSubPr>
+                        <m:e>
+                          <m:r>
+                            <a:rPr lang="cs-CZ" i="1">
+                              <a:latin typeface="Cambria Math" panose="02040503050406030204" pitchFamily="18" charset="0"/>
+                            </a:rPr>
+                            <m:t>𝑅</m:t>
+                          </m:r>
+                        </m:e>
+                        <m:sub>
+                          <m:r>
+                            <a:rPr lang="cs-CZ" i="1">
+                              <a:latin typeface="Cambria Math" panose="02040503050406030204" pitchFamily="18" charset="0"/>
+                            </a:rPr>
+                            <m:t>𝐷𝑁𝐹</m:t>
+                          </m:r>
+                        </m:sub>
+                      </m:sSub>
+                      <m:d>
+                        <m:dPr>
+                          <m:ctrlPr>
+                            <a:rPr lang="cs-CZ" i="1">
+                              <a:latin typeface="Cambria Math" panose="02040503050406030204" pitchFamily="18" charset="0"/>
+                            </a:rPr>
+                          </m:ctrlPr>
+                        </m:dPr>
+                        <m:e>
+                          <m:r>
+                            <a:rPr lang="cs-CZ" i="1">
+                              <a:latin typeface="Cambria Math" panose="02040503050406030204" pitchFamily="18" charset="0"/>
+                            </a:rPr>
+                            <m:t>𝑢</m:t>
+                          </m:r>
+                          <m:r>
+                            <a:rPr lang="cs-CZ" i="1">
+                              <a:latin typeface="Cambria Math" panose="02040503050406030204" pitchFamily="18" charset="0"/>
+                            </a:rPr>
+                            <m:t>,</m:t>
+                          </m:r>
+                          <m:r>
+                            <a:rPr lang="cs-CZ" i="1">
+                              <a:latin typeface="Cambria Math" panose="02040503050406030204" pitchFamily="18" charset="0"/>
+                            </a:rPr>
+                            <m:t>𝑣</m:t>
+                          </m:r>
+                        </m:e>
+                      </m:d>
+                      <m:r>
+                        <a:rPr lang="cs-CZ" i="1">
+                          <a:latin typeface="Cambria Math" panose="02040503050406030204" pitchFamily="18" charset="0"/>
+                        </a:rPr>
+                        <m:t>= </m:t>
+                      </m:r>
+                      <m:nary>
+                        <m:naryPr>
+                          <m:chr m:val="⋁"/>
+                          <m:limLoc m:val="undOvr"/>
+                          <m:ctrlPr>
+                            <a:rPr lang="cs-CZ" i="1">
+                              <a:latin typeface="Cambria Math" panose="02040503050406030204" pitchFamily="18" charset="0"/>
+                            </a:rPr>
+                          </m:ctrlPr>
+                        </m:naryPr>
+                        <m:sub>
+                          <m:r>
+                            <a:rPr lang="cs-CZ" i="1">
+                              <a:latin typeface="Cambria Math" panose="02040503050406030204" pitchFamily="18" charset="0"/>
+                            </a:rPr>
+                            <m:t>𝑖</m:t>
+                          </m:r>
+                          <m:r>
+                            <a:rPr lang="cs-CZ" i="1">
+                              <a:latin typeface="Cambria Math" panose="02040503050406030204" pitchFamily="18" charset="0"/>
+                            </a:rPr>
+                            <m:t>=1</m:t>
+                          </m:r>
+                        </m:sub>
+                        <m:sup>
+                          <m:r>
+                            <a:rPr lang="cs-CZ" i="1">
+                              <a:latin typeface="Cambria Math" panose="02040503050406030204" pitchFamily="18" charset="0"/>
+                            </a:rPr>
+                            <m:t>𝑚</m:t>
+                          </m:r>
+                        </m:sup>
+                        <m:e>
+                          <m:r>
+                            <a:rPr lang="cs-CZ" i="1">
+                              <a:latin typeface="Cambria Math" panose="02040503050406030204" pitchFamily="18" charset="0"/>
+                            </a:rPr>
+                            <m:t>(</m:t>
+                          </m:r>
+                        </m:e>
+                      </m:nary>
+                      <m:sSub>
+                        <m:sSubPr>
+                          <m:ctrlPr>
+                            <a:rPr lang="cs-CZ" i="1">
+                              <a:latin typeface="Cambria Math" panose="02040503050406030204" pitchFamily="18" charset="0"/>
+                            </a:rPr>
+                          </m:ctrlPr>
+                        </m:sSubPr>
+                        <m:e>
+                          <m:r>
+                            <a:rPr lang="cs-CZ" i="1">
+                              <a:latin typeface="Cambria Math" panose="02040503050406030204" pitchFamily="18" charset="0"/>
+                            </a:rPr>
+                            <m:t>𝐴</m:t>
+                          </m:r>
+                        </m:e>
+                        <m:sub>
+                          <m:r>
+                            <a:rPr lang="cs-CZ" i="1">
+                              <a:latin typeface="Cambria Math" panose="02040503050406030204" pitchFamily="18" charset="0"/>
+                            </a:rPr>
+                            <m:t>𝑖</m:t>
+                          </m:r>
+                        </m:sub>
+                      </m:sSub>
+                      <m:d>
+                        <m:dPr>
+                          <m:ctrlPr>
+                            <a:rPr lang="cs-CZ" i="1">
+                              <a:latin typeface="Cambria Math" panose="02040503050406030204" pitchFamily="18" charset="0"/>
+                            </a:rPr>
+                          </m:ctrlPr>
+                        </m:dPr>
+                        <m:e>
+                          <m:r>
+                            <a:rPr lang="cs-CZ" i="1">
+                              <a:latin typeface="Cambria Math" panose="02040503050406030204" pitchFamily="18" charset="0"/>
+                            </a:rPr>
+                            <m:t>𝑢</m:t>
+                          </m:r>
+                        </m:e>
+                      </m:d>
+                      <m:r>
+                        <a:rPr lang="cs-CZ" b="1" i="1">
+                          <a:latin typeface="Cambria Math" panose="02040503050406030204" pitchFamily="18" charset="0"/>
+                        </a:rPr>
+                        <m:t> </m:t>
+                      </m:r>
+                      <m:r>
+                        <a:rPr lang="cs-CZ" b="1" i="1">
+                          <a:latin typeface="Cambria Math" panose="02040503050406030204" pitchFamily="18" charset="0"/>
+                        </a:rPr>
+                        <m:t>𝑻</m:t>
+                      </m:r>
+                      <m:r>
+                        <a:rPr lang="cs-CZ" i="1">
+                          <a:latin typeface="Cambria Math" panose="02040503050406030204" pitchFamily="18" charset="0"/>
+                        </a:rPr>
+                        <m:t> </m:t>
+                      </m:r>
+                      <m:sSub>
+                        <m:sSubPr>
+                          <m:ctrlPr>
+                            <a:rPr lang="cs-CZ" i="1">
+                              <a:latin typeface="Cambria Math" panose="02040503050406030204" pitchFamily="18" charset="0"/>
+                            </a:rPr>
+                          </m:ctrlPr>
+                        </m:sSubPr>
+                        <m:e>
+                          <m:r>
+                            <a:rPr lang="cs-CZ" i="1">
+                              <a:latin typeface="Cambria Math" panose="02040503050406030204" pitchFamily="18" charset="0"/>
+                            </a:rPr>
+                            <m:t>𝐵</m:t>
+                          </m:r>
+                        </m:e>
+                        <m:sub>
+                          <m:r>
+                            <a:rPr lang="cs-CZ" i="1">
+                              <a:latin typeface="Cambria Math" panose="02040503050406030204" pitchFamily="18" charset="0"/>
+                            </a:rPr>
+                            <m:t>𝑖</m:t>
+                          </m:r>
+                        </m:sub>
+                      </m:sSub>
+                      <m:r>
+                        <a:rPr lang="cs-CZ" i="1">
+                          <a:latin typeface="Cambria Math" panose="02040503050406030204" pitchFamily="18" charset="0"/>
+                        </a:rPr>
+                        <m:t>(</m:t>
+                      </m:r>
+                      <m:r>
+                        <a:rPr lang="cs-CZ" i="1">
+                          <a:latin typeface="Cambria Math" panose="02040503050406030204" pitchFamily="18" charset="0"/>
+                        </a:rPr>
+                        <m:t>𝑣</m:t>
+                      </m:r>
+                      <m:r>
+                        <a:rPr lang="cs-CZ" i="1">
+                          <a:latin typeface="Cambria Math" panose="02040503050406030204" pitchFamily="18" charset="0"/>
+                        </a:rPr>
+                        <m:t>))</m:t>
+                      </m:r>
+                    </m:oMath>
+                  </m:oMathPara>
+                </a14:m>
+                <a:endParaRPr lang="cs-CZ" sz="1400" dirty="0"/>
+              </a:p>
+            </p:txBody>
+          </p:sp>
+        </mc:Choice>
+        <mc:Fallback xmlns="">
+          <p:sp>
+            <p:nvSpPr>
+              <p:cNvPr id="8" name="Obdélník 7">
+                <a:extLst>
+                  <a:ext uri="{FF2B5EF4-FFF2-40B4-BE49-F238E27FC236}">
+                    <a16:creationId xmlns:a16="http://schemas.microsoft.com/office/drawing/2014/main" id="{067E6CDB-0A1B-420C-9E7D-CCAC60495719}"/>
+                  </a:ext>
+                </a:extLst>
+              </p:cNvPr>
+              <p:cNvSpPr>
+                <a:spLocks noRot="1" noChangeAspect="1" noMove="1" noResize="1" noEditPoints="1" noAdjustHandles="1" noChangeArrowheads="1" noChangeShapeType="1" noTextEdit="1"/>
+              </p:cNvSpPr>
+              <p:nvPr/>
+            </p:nvSpPr>
+            <p:spPr>
+              <a:xfrm>
+                <a:off x="3707904" y="3520706"/>
+                <a:ext cx="3823596" cy="844398"/>
+              </a:xfrm>
+              <a:prstGeom prst="rect">
+                <a:avLst/>
+              </a:prstGeom>
+              <a:blipFill>
+                <a:blip r:embed="rId4"/>
+                <a:stretch>
+                  <a:fillRect/>
+                </a:stretch>
+              </a:blipFill>
+            </p:spPr>
+            <p:txBody>
+              <a:bodyPr/>
+              <a:lstStyle/>
+              <a:p>
+                <a:r>
+                  <a:rPr lang="cs-CZ">
+                    <a:noFill/>
+                  </a:rPr>
+                  <a:t> </a:t>
+                </a:r>
+              </a:p>
+            </p:txBody>
+          </p:sp>
+        </mc:Fallback>
+      </mc:AlternateContent>
     </p:spTree>
+    <p:extLst>
+      <p:ext uri="{BB962C8B-B14F-4D97-AF65-F5344CB8AC3E}">
+        <p14:creationId xmlns:p14="http://schemas.microsoft.com/office/powerpoint/2010/main" val="3435794864"/>
+      </p:ext>
+    </p:extLst>
   </p:cSld>
   <p:clrMapOvr>
     <a:masterClrMapping/>
@@ -4636,9 +5459,45 @@
           <a:chExt cx="0" cy="0"/>
         </a:xfrm>
       </p:grpSpPr>
-      <p:sp>
-        <p:nvSpPr>
-          <p:cNvPr id="2" name="Nadpis 1"/>
+      <p:pic>
+        <p:nvPicPr>
+          <p:cNvPr id="8" name="Obrázek 7">
+            <a:extLst>
+              <a:ext uri="{FF2B5EF4-FFF2-40B4-BE49-F238E27FC236}">
+                <a16:creationId xmlns:a16="http://schemas.microsoft.com/office/drawing/2014/main" id="{79A415C1-559A-4A4E-9D2E-432546E51453}"/>
+              </a:ext>
+            </a:extLst>
+          </p:cNvPr>
+          <p:cNvPicPr>
+            <a:picLocks noChangeAspect="1"/>
+          </p:cNvPicPr>
+          <p:nvPr/>
+        </p:nvPicPr>
+        <p:blipFill>
+          <a:blip r:embed="rId2"/>
+          <a:stretch>
+            <a:fillRect/>
+          </a:stretch>
+        </p:blipFill>
+        <p:spPr>
+          <a:xfrm>
+            <a:off x="971600" y="3284984"/>
+            <a:ext cx="5719011" cy="2448272"/>
+          </a:xfrm>
+          <a:prstGeom prst="rect">
+            <a:avLst/>
+          </a:prstGeom>
+        </p:spPr>
+      </p:pic>
+      <p:sp>
+        <p:nvSpPr>
+          <p:cNvPr id="2" name="Nadpis 1">
+            <a:extLst>
+              <a:ext uri="{FF2B5EF4-FFF2-40B4-BE49-F238E27FC236}">
+                <a16:creationId xmlns:a16="http://schemas.microsoft.com/office/drawing/2014/main" id="{BD5C37B1-BBF8-4013-9872-34FABF4E0475}"/>
+              </a:ext>
+            </a:extLst>
+          </p:cNvPr>
           <p:cNvSpPr>
             <a:spLocks noGrp="1"/>
           </p:cNvSpPr>
@@ -4653,14 +5512,20 @@
           <a:p>
             <a:r>
               <a:rPr lang="cs-CZ" dirty="0"/>
-              <a:t>Otázky vedoucího</a:t>
-            </a:r>
-          </a:p>
-        </p:txBody>
-      </p:sp>
-      <p:sp>
-        <p:nvSpPr>
-          <p:cNvPr id="3" name="Zástupný symbol pro obsah 2"/>
+              <a:t>Představení aplikace</a:t>
+            </a:r>
+          </a:p>
+        </p:txBody>
+      </p:sp>
+      <p:sp>
+        <p:nvSpPr>
+          <p:cNvPr id="3" name="Zástupný obsah 2">
+            <a:extLst>
+              <a:ext uri="{FF2B5EF4-FFF2-40B4-BE49-F238E27FC236}">
+                <a16:creationId xmlns:a16="http://schemas.microsoft.com/office/drawing/2014/main" id="{07C6F296-6952-424B-BFEE-A1BA6DADE113}"/>
+              </a:ext>
+            </a:extLst>
+          </p:cNvPr>
           <p:cNvSpPr>
             <a:spLocks noGrp="1"/>
           </p:cNvSpPr>
@@ -4674,15 +5539,28 @@
           <a:lstStyle/>
           <a:p>
             <a:r>
-              <a:rPr lang="cs-CZ" sz="2800" dirty="0"/>
-              <a:t>Otázky…</a:t>
-            </a:r>
-          </a:p>
-        </p:txBody>
-      </p:sp>
-      <p:sp>
-        <p:nvSpPr>
-          <p:cNvPr id="4" name="Zástupný symbol pro číslo snímku 3"/>
+              <a:rPr lang="cs-CZ" dirty="0"/>
+              <a:t>Příklady použití fuzzy logiky</a:t>
+            </a:r>
+          </a:p>
+          <a:p>
+            <a:pPr lvl="1"/>
+            <a:r>
+              <a:rPr lang="cs-CZ" dirty="0"/>
+              <a:t>Rychlost vozidel</a:t>
+            </a:r>
+          </a:p>
+        </p:txBody>
+      </p:sp>
+      <p:sp>
+        <p:nvSpPr>
+          <p:cNvPr id="4" name="Zástupný symbol pro číslo snímku 3">
+            <a:extLst>
+              <a:ext uri="{FF2B5EF4-FFF2-40B4-BE49-F238E27FC236}">
+                <a16:creationId xmlns:a16="http://schemas.microsoft.com/office/drawing/2014/main" id="{DB4C9DF6-D4C8-4956-B62B-E67BE362B203}"/>
+              </a:ext>
+            </a:extLst>
+          </p:cNvPr>
           <p:cNvSpPr>
             <a:spLocks noGrp="1"/>
           </p:cNvSpPr>
@@ -4709,10 +5587,51 @@
           </a:p>
         </p:txBody>
       </p:sp>
+      <p:pic>
+        <p:nvPicPr>
+          <p:cNvPr id="5" name="obrázek 83">
+            <a:extLst>
+              <a:ext uri="{FF2B5EF4-FFF2-40B4-BE49-F238E27FC236}">
+                <a16:creationId xmlns:a16="http://schemas.microsoft.com/office/drawing/2014/main" id="{4DBCF541-8164-493E-8254-A5BD20502C9A}"/>
+              </a:ext>
+            </a:extLst>
+          </p:cNvPr>
+          <p:cNvPicPr/>
+          <p:nvPr/>
+        </p:nvPicPr>
+        <p:blipFill>
+          <a:blip r:embed="rId3">
+            <a:extLst>
+              <a:ext uri="{28A0092B-C50C-407E-A947-70E740481C1C}">
+                <a14:useLocalDpi xmlns:a14="http://schemas.microsoft.com/office/drawing/2010/main" val="0"/>
+              </a:ext>
+            </a:extLst>
+          </a:blip>
+          <a:srcRect/>
+          <a:stretch>
+            <a:fillRect/>
+          </a:stretch>
+        </p:blipFill>
+        <p:spPr bwMode="auto">
+          <a:xfrm>
+            <a:off x="4355976" y="2338270"/>
+            <a:ext cx="3960440" cy="1699189"/>
+          </a:xfrm>
+          <a:prstGeom prst="rect">
+            <a:avLst/>
+          </a:prstGeom>
+          <a:noFill/>
+          <a:ln>
+            <a:solidFill>
+              <a:schemeClr val="tx1"/>
+            </a:solidFill>
+          </a:ln>
+        </p:spPr>
+      </p:pic>
     </p:spTree>
     <p:extLst>
       <p:ext uri="{BB962C8B-B14F-4D97-AF65-F5344CB8AC3E}">
-        <p14:creationId xmlns:p14="http://schemas.microsoft.com/office/powerpoint/2010/main" val="3455987979"/>
+        <p14:creationId xmlns:p14="http://schemas.microsoft.com/office/powerpoint/2010/main" val="2854318792"/>
       </p:ext>
     </p:extLst>
   </p:cSld>
@@ -4756,7 +5675,7 @@
           <a:p>
             <a:r>
               <a:rPr lang="cs-CZ" dirty="0"/>
-              <a:t>Otázky oponenta</a:t>
+              <a:t>Zhodnocení práce</a:t>
             </a:r>
           </a:p>
         </p:txBody>
@@ -4778,11 +5697,22 @@
           <a:p>
             <a:r>
               <a:rPr lang="cs-CZ" sz="2800" dirty="0"/>
-              <a:t>Otázky…</a:t>
-            </a:r>
-          </a:p>
-          <a:p>
-            <a:endParaRPr lang="cs-CZ" dirty="0"/>
+              <a:t>Měření rozdílů</a:t>
+            </a:r>
+          </a:p>
+          <a:p>
+            <a:pPr lvl="1"/>
+            <a:r>
+              <a:rPr lang="cs-CZ" sz="2400" dirty="0"/>
+              <a:t>Rychlost jízdy vozidel</a:t>
+            </a:r>
+          </a:p>
+          <a:p>
+            <a:pPr lvl="1"/>
+            <a:r>
+              <a:rPr lang="cs-CZ" sz="2400" dirty="0"/>
+              <a:t>Úhel otočení vozidla</a:t>
+            </a:r>
           </a:p>
         </p:txBody>
       </p:sp>
@@ -4810,6 +5740,546 @@
                 <a:defRPr/>
               </a:pPr>
               <a:t>12</a:t>
+            </a:fld>
+            <a:endParaRPr lang="cs-CZ" dirty="0"/>
+          </a:p>
+        </p:txBody>
+      </p:sp>
+      <p:pic>
+        <p:nvPicPr>
+          <p:cNvPr id="7" name="Obrázek 6">
+            <a:extLst>
+              <a:ext uri="{FF2B5EF4-FFF2-40B4-BE49-F238E27FC236}">
+                <a16:creationId xmlns:a16="http://schemas.microsoft.com/office/drawing/2014/main" id="{F71B8D59-20F1-4831-A1AA-2F4B433E4200}"/>
+              </a:ext>
+            </a:extLst>
+          </p:cNvPr>
+          <p:cNvPicPr/>
+          <p:nvPr/>
+        </p:nvPicPr>
+        <p:blipFill>
+          <a:blip r:embed="rId2"/>
+          <a:stretch>
+            <a:fillRect/>
+          </a:stretch>
+        </p:blipFill>
+        <p:spPr>
+          <a:xfrm>
+            <a:off x="755576" y="4352481"/>
+            <a:ext cx="4751759" cy="1504416"/>
+          </a:xfrm>
+          <a:prstGeom prst="rect">
+            <a:avLst/>
+          </a:prstGeom>
+          <a:noFill/>
+          <a:ln>
+            <a:solidFill>
+              <a:schemeClr val="tx1"/>
+            </a:solidFill>
+          </a:ln>
+        </p:spPr>
+      </p:pic>
+      <p:pic>
+        <p:nvPicPr>
+          <p:cNvPr id="6" name="Obrázek 5">
+            <a:extLst>
+              <a:ext uri="{FF2B5EF4-FFF2-40B4-BE49-F238E27FC236}">
+                <a16:creationId xmlns:a16="http://schemas.microsoft.com/office/drawing/2014/main" id="{AE7DCF6F-638C-4A2F-9E6D-4005A2A98A1F}"/>
+              </a:ext>
+            </a:extLst>
+          </p:cNvPr>
+          <p:cNvPicPr/>
+          <p:nvPr/>
+        </p:nvPicPr>
+        <p:blipFill>
+          <a:blip r:embed="rId3"/>
+          <a:stretch>
+            <a:fillRect/>
+          </a:stretch>
+        </p:blipFill>
+        <p:spPr>
+          <a:xfrm>
+            <a:off x="3635896" y="2996952"/>
+            <a:ext cx="4902421" cy="1589101"/>
+          </a:xfrm>
+          <a:prstGeom prst="rect">
+            <a:avLst/>
+          </a:prstGeom>
+          <a:noFill/>
+          <a:ln>
+            <a:solidFill>
+              <a:schemeClr val="tx1"/>
+            </a:solidFill>
+          </a:ln>
+        </p:spPr>
+      </p:pic>
+    </p:spTree>
+    <p:extLst>
+      <p:ext uri="{BB962C8B-B14F-4D97-AF65-F5344CB8AC3E}">
+        <p14:creationId xmlns:p14="http://schemas.microsoft.com/office/powerpoint/2010/main" val="243088555"/>
+      </p:ext>
+    </p:extLst>
+  </p:cSld>
+  <p:clrMapOvr>
+    <a:masterClrMapping/>
+  </p:clrMapOvr>
+</p:sld>
+</file>
+
+<file path=ppt/slides/slide13.xml><?xml version="1.0" encoding="utf-8"?>
+<p:sld xmlns:a="http://schemas.openxmlformats.org/drawingml/2006/main" xmlns:r="http://schemas.openxmlformats.org/officeDocument/2006/relationships" xmlns:p="http://schemas.openxmlformats.org/presentationml/2006/main">
+  <p:cSld>
+    <p:spTree>
+      <p:nvGrpSpPr>
+        <p:cNvPr id="1" name=""/>
+        <p:cNvGrpSpPr/>
+        <p:nvPr/>
+      </p:nvGrpSpPr>
+      <p:grpSpPr>
+        <a:xfrm>
+          <a:off x="0" y="0"/>
+          <a:ext cx="0" cy="0"/>
+          <a:chOff x="0" y="0"/>
+          <a:chExt cx="0" cy="0"/>
+        </a:xfrm>
+      </p:grpSpPr>
+      <p:sp>
+        <p:nvSpPr>
+          <p:cNvPr id="2" name="Nadpis 1"/>
+          <p:cNvSpPr>
+            <a:spLocks noGrp="1"/>
+          </p:cNvSpPr>
+          <p:nvPr>
+            <p:ph type="title"/>
+          </p:nvPr>
+        </p:nvSpPr>
+        <p:spPr/>
+        <p:txBody>
+          <a:bodyPr/>
+          <a:lstStyle/>
+          <a:p>
+            <a:r>
+              <a:rPr lang="cs-CZ" dirty="0"/>
+              <a:t>Zhodnocení práce</a:t>
+            </a:r>
+          </a:p>
+        </p:txBody>
+      </p:sp>
+      <p:sp>
+        <p:nvSpPr>
+          <p:cNvPr id="3" name="Zástupný symbol pro obsah 2"/>
+          <p:cNvSpPr>
+            <a:spLocks noGrp="1"/>
+          </p:cNvSpPr>
+          <p:nvPr>
+            <p:ph sz="quarter" idx="13"/>
+          </p:nvPr>
+        </p:nvSpPr>
+        <p:spPr/>
+        <p:txBody>
+          <a:bodyPr/>
+          <a:lstStyle/>
+          <a:p>
+            <a:r>
+              <a:rPr lang="cs-CZ" sz="2800" dirty="0"/>
+              <a:t>Splnění cílů</a:t>
+            </a:r>
+          </a:p>
+          <a:p>
+            <a:pPr lvl="1"/>
+            <a:r>
+              <a:rPr lang="cs-CZ" sz="2400" dirty="0"/>
+              <a:t>Použití fuzzy logiky</a:t>
+            </a:r>
+          </a:p>
+          <a:p>
+            <a:pPr lvl="1"/>
+            <a:r>
+              <a:rPr lang="cs-CZ" sz="2400" dirty="0"/>
+              <a:t>Rozšíření BP</a:t>
+            </a:r>
+          </a:p>
+          <a:p>
+            <a:r>
+              <a:rPr lang="cs-CZ" sz="2800" dirty="0"/>
+              <a:t>Silné stránky aplikace</a:t>
+            </a:r>
+          </a:p>
+          <a:p>
+            <a:pPr lvl="1"/>
+            <a:r>
+              <a:rPr lang="cs-CZ" sz="2400" dirty="0"/>
+              <a:t>Plynulý pohyb</a:t>
+            </a:r>
+          </a:p>
+          <a:p>
+            <a:pPr lvl="1"/>
+            <a:r>
+              <a:rPr lang="cs-CZ" sz="2400" dirty="0"/>
+              <a:t>Funkčnost aplikace</a:t>
+            </a:r>
+          </a:p>
+          <a:p>
+            <a:r>
+              <a:rPr lang="cs-CZ" sz="2800" dirty="0"/>
+              <a:t>Slabé stránky</a:t>
+            </a:r>
+          </a:p>
+          <a:p>
+            <a:pPr lvl="1"/>
+            <a:r>
+              <a:rPr lang="cs-CZ" sz="2400" dirty="0"/>
+              <a:t>Systémová náročnost</a:t>
+            </a:r>
+          </a:p>
+        </p:txBody>
+      </p:sp>
+      <p:sp>
+        <p:nvSpPr>
+          <p:cNvPr id="4" name="Zástupný symbol pro číslo snímku 3"/>
+          <p:cNvSpPr>
+            <a:spLocks noGrp="1"/>
+          </p:cNvSpPr>
+          <p:nvPr>
+            <p:ph type="sldNum" sz="quarter" idx="16"/>
+          </p:nvPr>
+        </p:nvSpPr>
+        <p:spPr/>
+        <p:txBody>
+          <a:bodyPr/>
+          <a:lstStyle/>
+          <a:p>
+            <a:pPr>
+              <a:defRPr/>
+            </a:pPr>
+            <a:fld id="{56CDC768-3DE3-479D-89FC-7F989B177BF5}" type="slidenum">
+              <a:rPr lang="cs-CZ" smtClean="0"/>
+              <a:pPr>
+                <a:defRPr/>
+              </a:pPr>
+              <a:t>13</a:t>
+            </a:fld>
+            <a:endParaRPr lang="cs-CZ" dirty="0"/>
+          </a:p>
+        </p:txBody>
+      </p:sp>
+    </p:spTree>
+    <p:extLst>
+      <p:ext uri="{BB962C8B-B14F-4D97-AF65-F5344CB8AC3E}">
+        <p14:creationId xmlns:p14="http://schemas.microsoft.com/office/powerpoint/2010/main" val="4253892387"/>
+      </p:ext>
+    </p:extLst>
+  </p:cSld>
+  <p:clrMapOvr>
+    <a:masterClrMapping/>
+  </p:clrMapOvr>
+</p:sld>
+</file>
+
+<file path=ppt/slides/slide14.xml><?xml version="1.0" encoding="utf-8"?>
+<p:sld xmlns:a="http://schemas.openxmlformats.org/drawingml/2006/main" xmlns:r="http://schemas.openxmlformats.org/officeDocument/2006/relationships" xmlns:p="http://schemas.openxmlformats.org/presentationml/2006/main">
+  <p:cSld>
+    <p:spTree>
+      <p:nvGrpSpPr>
+        <p:cNvPr id="1" name=""/>
+        <p:cNvGrpSpPr/>
+        <p:nvPr/>
+      </p:nvGrpSpPr>
+      <p:grpSpPr>
+        <a:xfrm>
+          <a:off x="0" y="0"/>
+          <a:ext cx="0" cy="0"/>
+          <a:chOff x="0" y="0"/>
+          <a:chExt cx="0" cy="0"/>
+        </a:xfrm>
+      </p:grpSpPr>
+      <p:sp>
+        <p:nvSpPr>
+          <p:cNvPr id="3" name="Zástupný symbol pro obsah 2"/>
+          <p:cNvSpPr>
+            <a:spLocks noGrp="1"/>
+          </p:cNvSpPr>
+          <p:nvPr>
+            <p:ph idx="1"/>
+          </p:nvPr>
+        </p:nvSpPr>
+        <p:spPr>
+          <a:xfrm>
+            <a:off x="1691680" y="2204864"/>
+            <a:ext cx="7283152" cy="5434013"/>
+          </a:xfrm>
+        </p:spPr>
+        <p:txBody>
+          <a:bodyPr rtlCol="0">
+            <a:normAutofit/>
+          </a:bodyPr>
+          <a:lstStyle/>
+          <a:p>
+            <a:pPr eaLnBrk="1" fontAlgn="auto" hangingPunct="1">
+              <a:spcAft>
+                <a:spcPts val="0"/>
+              </a:spcAft>
+              <a:defRPr/>
+            </a:pPr>
+            <a:endParaRPr lang="cs-CZ" dirty="0"/>
+          </a:p>
+          <a:p>
+            <a:pPr marL="0" indent="0" eaLnBrk="1" fontAlgn="auto" hangingPunct="1">
+              <a:spcAft>
+                <a:spcPts val="0"/>
+              </a:spcAft>
+              <a:buFont typeface="Arial" panose="020B0604020202020204" pitchFamily="34" charset="0"/>
+              <a:buNone/>
+              <a:defRPr/>
+            </a:pPr>
+            <a:r>
+              <a:rPr lang="cs-CZ" sz="4800" dirty="0">
+                <a:solidFill>
+                  <a:schemeClr val="accent3">
+                    <a:lumMod val="75000"/>
+                  </a:schemeClr>
+                </a:solidFill>
+              </a:rPr>
+              <a:t>Děkuji za pozornost.</a:t>
+            </a:r>
+            <a:endParaRPr lang="cs-CZ" sz="1400" dirty="0">
+              <a:solidFill>
+                <a:schemeClr val="accent3">
+                  <a:lumMod val="75000"/>
+                </a:schemeClr>
+              </a:solidFill>
+            </a:endParaRPr>
+          </a:p>
+        </p:txBody>
+      </p:sp>
+      <p:sp>
+        <p:nvSpPr>
+          <p:cNvPr id="4" name="Zástupný symbol pro číslo snímku 3"/>
+          <p:cNvSpPr>
+            <a:spLocks noGrp="1"/>
+          </p:cNvSpPr>
+          <p:nvPr>
+            <p:ph type="sldNum" sz="quarter" idx="12"/>
+          </p:nvPr>
+        </p:nvSpPr>
+        <p:spPr/>
+        <p:txBody>
+          <a:bodyPr/>
+          <a:lstStyle/>
+          <a:p>
+            <a:pPr>
+              <a:defRPr/>
+            </a:pPr>
+            <a:fld id="{97167BA6-C5C0-4AE9-8563-CCC31371C1AC}" type="slidenum">
+              <a:rPr lang="cs-CZ" smtClean="0"/>
+              <a:pPr>
+                <a:defRPr/>
+              </a:pPr>
+              <a:t>14</a:t>
+            </a:fld>
+            <a:endParaRPr lang="cs-CZ"/>
+          </a:p>
+        </p:txBody>
+      </p:sp>
+    </p:spTree>
+  </p:cSld>
+  <p:clrMapOvr>
+    <a:masterClrMapping/>
+  </p:clrMapOvr>
+</p:sld>
+</file>
+
+<file path=ppt/slides/slide15.xml><?xml version="1.0" encoding="utf-8"?>
+<p:sld xmlns:a="http://schemas.openxmlformats.org/drawingml/2006/main" xmlns:r="http://schemas.openxmlformats.org/officeDocument/2006/relationships" xmlns:p="http://schemas.openxmlformats.org/presentationml/2006/main">
+  <p:cSld>
+    <p:spTree>
+      <p:nvGrpSpPr>
+        <p:cNvPr id="1" name=""/>
+        <p:cNvGrpSpPr/>
+        <p:nvPr/>
+      </p:nvGrpSpPr>
+      <p:grpSpPr>
+        <a:xfrm>
+          <a:off x="0" y="0"/>
+          <a:ext cx="0" cy="0"/>
+          <a:chOff x="0" y="0"/>
+          <a:chExt cx="0" cy="0"/>
+        </a:xfrm>
+      </p:grpSpPr>
+      <p:sp>
+        <p:nvSpPr>
+          <p:cNvPr id="2" name="Nadpis 1"/>
+          <p:cNvSpPr>
+            <a:spLocks noGrp="1"/>
+          </p:cNvSpPr>
+          <p:nvPr>
+            <p:ph type="title"/>
+          </p:nvPr>
+        </p:nvSpPr>
+        <p:spPr/>
+        <p:txBody>
+          <a:bodyPr/>
+          <a:lstStyle/>
+          <a:p>
+            <a:r>
+              <a:rPr lang="cs-CZ" dirty="0"/>
+              <a:t>Otázky vedoucího</a:t>
+            </a:r>
+          </a:p>
+        </p:txBody>
+      </p:sp>
+      <p:sp>
+        <p:nvSpPr>
+          <p:cNvPr id="3" name="Zástupný symbol pro obsah 2"/>
+          <p:cNvSpPr>
+            <a:spLocks noGrp="1"/>
+          </p:cNvSpPr>
+          <p:nvPr>
+            <p:ph sz="quarter" idx="13"/>
+          </p:nvPr>
+        </p:nvSpPr>
+        <p:spPr/>
+        <p:txBody>
+          <a:bodyPr/>
+          <a:lstStyle/>
+          <a:p>
+            <a:r>
+              <a:rPr lang="cs-CZ" sz="2800" dirty="0"/>
+              <a:t>Otázky…</a:t>
+            </a:r>
+          </a:p>
+        </p:txBody>
+      </p:sp>
+      <p:sp>
+        <p:nvSpPr>
+          <p:cNvPr id="4" name="Zástupný symbol pro číslo snímku 3"/>
+          <p:cNvSpPr>
+            <a:spLocks noGrp="1"/>
+          </p:cNvSpPr>
+          <p:nvPr>
+            <p:ph type="sldNum" sz="quarter" idx="16"/>
+          </p:nvPr>
+        </p:nvSpPr>
+        <p:spPr/>
+        <p:txBody>
+          <a:bodyPr/>
+          <a:lstStyle/>
+          <a:p>
+            <a:pPr>
+              <a:defRPr/>
+            </a:pPr>
+            <a:fld id="{56CDC768-3DE3-479D-89FC-7F989B177BF5}" type="slidenum">
+              <a:rPr lang="cs-CZ" smtClean="0"/>
+              <a:pPr>
+                <a:defRPr/>
+              </a:pPr>
+              <a:t>15</a:t>
+            </a:fld>
+            <a:endParaRPr lang="cs-CZ" dirty="0"/>
+          </a:p>
+        </p:txBody>
+      </p:sp>
+    </p:spTree>
+    <p:extLst>
+      <p:ext uri="{BB962C8B-B14F-4D97-AF65-F5344CB8AC3E}">
+        <p14:creationId xmlns:p14="http://schemas.microsoft.com/office/powerpoint/2010/main" val="3455987979"/>
+      </p:ext>
+    </p:extLst>
+  </p:cSld>
+  <p:clrMapOvr>
+    <a:masterClrMapping/>
+  </p:clrMapOvr>
+</p:sld>
+</file>
+
+<file path=ppt/slides/slide16.xml><?xml version="1.0" encoding="utf-8"?>
+<p:sld xmlns:a="http://schemas.openxmlformats.org/drawingml/2006/main" xmlns:r="http://schemas.openxmlformats.org/officeDocument/2006/relationships" xmlns:p="http://schemas.openxmlformats.org/presentationml/2006/main">
+  <p:cSld>
+    <p:spTree>
+      <p:nvGrpSpPr>
+        <p:cNvPr id="1" name=""/>
+        <p:cNvGrpSpPr/>
+        <p:nvPr/>
+      </p:nvGrpSpPr>
+      <p:grpSpPr>
+        <a:xfrm>
+          <a:off x="0" y="0"/>
+          <a:ext cx="0" cy="0"/>
+          <a:chOff x="0" y="0"/>
+          <a:chExt cx="0" cy="0"/>
+        </a:xfrm>
+      </p:grpSpPr>
+      <p:sp>
+        <p:nvSpPr>
+          <p:cNvPr id="2" name="Nadpis 1"/>
+          <p:cNvSpPr>
+            <a:spLocks noGrp="1"/>
+          </p:cNvSpPr>
+          <p:nvPr>
+            <p:ph type="title"/>
+          </p:nvPr>
+        </p:nvSpPr>
+        <p:spPr/>
+        <p:txBody>
+          <a:bodyPr/>
+          <a:lstStyle/>
+          <a:p>
+            <a:r>
+              <a:rPr lang="cs-CZ" dirty="0"/>
+              <a:t>Otázky oponenta</a:t>
+            </a:r>
+          </a:p>
+        </p:txBody>
+      </p:sp>
+      <p:sp>
+        <p:nvSpPr>
+          <p:cNvPr id="3" name="Zástupný symbol pro obsah 2"/>
+          <p:cNvSpPr>
+            <a:spLocks noGrp="1"/>
+          </p:cNvSpPr>
+          <p:nvPr>
+            <p:ph sz="quarter" idx="13"/>
+          </p:nvPr>
+        </p:nvSpPr>
+        <p:spPr/>
+        <p:txBody>
+          <a:bodyPr/>
+          <a:lstStyle/>
+          <a:p>
+            <a:r>
+              <a:rPr lang="cs-CZ" sz="2800" dirty="0"/>
+              <a:t>Otázky…</a:t>
+            </a:r>
+          </a:p>
+          <a:p>
+            <a:endParaRPr lang="cs-CZ" dirty="0"/>
+          </a:p>
+        </p:txBody>
+      </p:sp>
+      <p:sp>
+        <p:nvSpPr>
+          <p:cNvPr id="4" name="Zástupný symbol pro číslo snímku 3"/>
+          <p:cNvSpPr>
+            <a:spLocks noGrp="1"/>
+          </p:cNvSpPr>
+          <p:nvPr>
+            <p:ph type="sldNum" sz="quarter" idx="16"/>
+          </p:nvPr>
+        </p:nvSpPr>
+        <p:spPr/>
+        <p:txBody>
+          <a:bodyPr/>
+          <a:lstStyle/>
+          <a:p>
+            <a:pPr>
+              <a:defRPr/>
+            </a:pPr>
+            <a:fld id="{56CDC768-3DE3-479D-89FC-7F989B177BF5}" type="slidenum">
+              <a:rPr lang="cs-CZ" smtClean="0"/>
+              <a:pPr>
+                <a:defRPr/>
+              </a:pPr>
+              <a:t>16</a:t>
             </a:fld>
             <a:endParaRPr lang="cs-CZ" dirty="0"/>
           </a:p>
@@ -5017,7 +6487,7 @@
           <a:p>
             <a:r>
               <a:rPr lang="cs-CZ" sz="2800" dirty="0"/>
-              <a:t>Aplikace fuzzy přístupu do řízení pohybu vozidel v simulátoru křižovatky</a:t>
+              <a:t>Vytvoření fuzzy přístupu pro řízení pohybu vozidel v simulátoru křižovatky</a:t>
             </a:r>
           </a:p>
           <a:p>
@@ -5255,7 +6725,7 @@
           <a:p>
             <a:r>
               <a:rPr lang="cs-CZ" sz="2800" dirty="0"/>
-              <a:t>Podobné problémy, ještě budu doplňovat do textu</a:t>
+              <a:t>Podobné problémy</a:t>
             </a:r>
           </a:p>
         </p:txBody>
@@ -5461,46 +6931,39 @@
           </a:p>
         </p:txBody>
       </p:sp>
-      <p:sp>
-        <p:nvSpPr>
-          <p:cNvPr id="5" name="TextovéPole 4">
+      <p:pic>
+        <p:nvPicPr>
+          <p:cNvPr id="6" name="Obrázek 5">
             <a:extLst>
               <a:ext uri="{FF2B5EF4-FFF2-40B4-BE49-F238E27FC236}">
-                <a16:creationId xmlns:a16="http://schemas.microsoft.com/office/drawing/2014/main" id="{F2EE5AC3-8562-40EF-8E72-C09668662903}"/>
+                <a16:creationId xmlns:a16="http://schemas.microsoft.com/office/drawing/2014/main" id="{E7AC43E7-8C33-40D3-9594-84711010F142}"/>
               </a:ext>
             </a:extLst>
           </p:cNvPr>
-          <p:cNvSpPr txBox="1"/>
+          <p:cNvPicPr/>
           <p:nvPr/>
-        </p:nvSpPr>
+        </p:nvPicPr>
+        <p:blipFill>
+          <a:blip r:embed="rId2"/>
+          <a:stretch>
+            <a:fillRect/>
+          </a:stretch>
+        </p:blipFill>
         <p:spPr>
           <a:xfrm>
-            <a:off x="5436096" y="3429000"/>
-            <a:ext cx="3600400" cy="369332"/>
+            <a:off x="4067944" y="1700807"/>
+            <a:ext cx="4248472" cy="2738033"/>
           </a:xfrm>
           <a:prstGeom prst="rect">
             <a:avLst/>
           </a:prstGeom>
-          <a:noFill/>
+          <a:ln>
+            <a:solidFill>
+              <a:schemeClr val="tx1"/>
+            </a:solidFill>
+          </a:ln>
         </p:spPr>
-        <p:txBody>
-          <a:bodyPr wrap="square" rtlCol="0">
-            <a:spAutoFit/>
-          </a:bodyPr>
-          <a:lstStyle/>
-          <a:p>
-            <a:r>
-              <a:rPr lang="cs-CZ" dirty="0"/>
-              <a:t>Obrázek </a:t>
-            </a:r>
-            <a:r>
-              <a:rPr lang="cs-CZ" dirty="0" err="1"/>
-              <a:t>gui</a:t>
-            </a:r>
-            <a:endParaRPr lang="cs-CZ" dirty="0"/>
-          </a:p>
-        </p:txBody>
-      </p:sp>
+      </p:pic>
     </p:spTree>
     <p:extLst>
       <p:ext uri="{BB962C8B-B14F-4D97-AF65-F5344CB8AC3E}">
@@ -5536,7 +6999,7 @@
           <p:cNvPr id="2" name="Nadpis 1">
             <a:extLst>
               <a:ext uri="{FF2B5EF4-FFF2-40B4-BE49-F238E27FC236}">
-                <a16:creationId xmlns:a16="http://schemas.microsoft.com/office/drawing/2014/main" id="{A54F850E-FBE5-4CBE-9D72-1B28E793C3DC}"/>
+                <a16:creationId xmlns:a16="http://schemas.microsoft.com/office/drawing/2014/main" id="{5D0F2768-F75C-4659-90A7-B9835F07BFA6}"/>
               </a:ext>
             </a:extLst>
           </p:cNvPr>
@@ -5564,7 +7027,7 @@
           <p:cNvPr id="3" name="Zástupný obsah 2">
             <a:extLst>
               <a:ext uri="{FF2B5EF4-FFF2-40B4-BE49-F238E27FC236}">
-                <a16:creationId xmlns:a16="http://schemas.microsoft.com/office/drawing/2014/main" id="{8F397D2B-8121-4EB3-AB24-D53988BE96CC}"/>
+                <a16:creationId xmlns:a16="http://schemas.microsoft.com/office/drawing/2014/main" id="{B0F5CBF7-DB2F-4336-8740-D47F191E867A}"/>
               </a:ext>
             </a:extLst>
           </p:cNvPr>
@@ -5582,41 +7045,7 @@
           <a:p>
             <a:r>
               <a:rPr lang="cs-CZ" dirty="0"/>
-              <a:t>Fuzzy logika</a:t>
-            </a:r>
-          </a:p>
-          <a:p>
-            <a:pPr lvl="1"/>
-            <a:r>
-              <a:rPr lang="cs-CZ" dirty="0"/>
-              <a:t>Jízda za sebou</a:t>
-            </a:r>
-          </a:p>
-          <a:p>
-            <a:pPr lvl="1"/>
-            <a:r>
-              <a:rPr lang="cs-CZ" dirty="0"/>
-              <a:t>Určení přednosti</a:t>
-            </a:r>
-          </a:p>
-          <a:p>
-            <a:r>
-              <a:rPr lang="cs-CZ" dirty="0"/>
-              <a:t>Použitá logika</a:t>
-            </a:r>
-          </a:p>
-          <a:p>
-            <a:pPr lvl="1"/>
-            <a:r>
-              <a:rPr lang="cs-CZ" dirty="0"/>
-              <a:t>DNF</a:t>
-            </a:r>
-          </a:p>
-          <a:p>
-            <a:pPr lvl="1"/>
-            <a:r>
-              <a:rPr lang="cs-CZ" dirty="0"/>
-              <a:t>COG</a:t>
+              <a:t>Režim návrhu</a:t>
             </a:r>
           </a:p>
         </p:txBody>
@@ -5626,7 +7055,7 @@
           <p:cNvPr id="4" name="Zástupný symbol pro číslo snímku 3">
             <a:extLst>
               <a:ext uri="{FF2B5EF4-FFF2-40B4-BE49-F238E27FC236}">
-                <a16:creationId xmlns:a16="http://schemas.microsoft.com/office/drawing/2014/main" id="{6F2356E9-1801-43D2-94DD-FB114B35A0D6}"/>
+                <a16:creationId xmlns:a16="http://schemas.microsoft.com/office/drawing/2014/main" id="{8187C2EE-CAA4-496D-93AC-A5689DCBB4D3}"/>
               </a:ext>
             </a:extLst>
           </p:cNvPr>
@@ -5656,45 +7085,70 @@
           </a:p>
         </p:txBody>
       </p:sp>
-      <p:sp>
-        <p:nvSpPr>
-          <p:cNvPr id="5" name="TextovéPole 4">
+      <p:pic>
+        <p:nvPicPr>
+          <p:cNvPr id="11" name="Obrázek 10">
             <a:extLst>
               <a:ext uri="{FF2B5EF4-FFF2-40B4-BE49-F238E27FC236}">
-                <a16:creationId xmlns:a16="http://schemas.microsoft.com/office/drawing/2014/main" id="{073C6EC0-FA8C-4A72-8DF9-D51387F2FD9A}"/>
+                <a16:creationId xmlns:a16="http://schemas.microsoft.com/office/drawing/2014/main" id="{CF22F79F-57E8-4EDC-86CA-11650B208A80}"/>
               </a:ext>
             </a:extLst>
           </p:cNvPr>
-          <p:cNvSpPr txBox="1"/>
+          <p:cNvPicPr>
+            <a:picLocks noChangeAspect="1"/>
+          </p:cNvPicPr>
           <p:nvPr/>
-        </p:nvSpPr>
+        </p:nvPicPr>
+        <p:blipFill>
+          <a:blip r:embed="rId3"/>
+          <a:stretch>
+            <a:fillRect/>
+          </a:stretch>
+        </p:blipFill>
         <p:spPr>
           <a:xfrm>
-            <a:off x="4932040" y="3422083"/>
-            <a:ext cx="4789512" cy="369332"/>
+            <a:off x="3635896" y="1738363"/>
+            <a:ext cx="4888528" cy="3014977"/>
           </a:xfrm>
           <a:prstGeom prst="rect">
             <a:avLst/>
           </a:prstGeom>
-          <a:noFill/>
         </p:spPr>
-        <p:txBody>
-          <a:bodyPr wrap="square" rtlCol="0">
-            <a:spAutoFit/>
-          </a:bodyPr>
-          <a:lstStyle/>
-          <a:p>
-            <a:r>
-              <a:rPr lang="cs-CZ" dirty="0"/>
-              <a:t>Obrázek pravidel/vzorečky</a:t>
-            </a:r>
-          </a:p>
-        </p:txBody>
-      </p:sp>
+      </p:pic>
+      <p:pic>
+        <p:nvPicPr>
+          <p:cNvPr id="12" name="Obrázek 11">
+            <a:extLst>
+              <a:ext uri="{FF2B5EF4-FFF2-40B4-BE49-F238E27FC236}">
+                <a16:creationId xmlns:a16="http://schemas.microsoft.com/office/drawing/2014/main" id="{852B531E-6A2A-4CCB-B0F0-EED308D684FC}"/>
+              </a:ext>
+            </a:extLst>
+          </p:cNvPr>
+          <p:cNvPicPr>
+            <a:picLocks noChangeAspect="1"/>
+          </p:cNvPicPr>
+          <p:nvPr/>
+        </p:nvPicPr>
+        <p:blipFill>
+          <a:blip r:embed="rId4"/>
+          <a:stretch>
+            <a:fillRect/>
+          </a:stretch>
+        </p:blipFill>
+        <p:spPr>
+          <a:xfrm>
+            <a:off x="612216" y="2564904"/>
+            <a:ext cx="5194823" cy="3217006"/>
+          </a:xfrm>
+          <a:prstGeom prst="rect">
+            <a:avLst/>
+          </a:prstGeom>
+        </p:spPr>
+      </p:pic>
     </p:spTree>
     <p:extLst>
       <p:ext uri="{BB962C8B-B14F-4D97-AF65-F5344CB8AC3E}">
-        <p14:creationId xmlns:p14="http://schemas.microsoft.com/office/powerpoint/2010/main" val="3435794864"/>
+        <p14:creationId xmlns:p14="http://schemas.microsoft.com/office/powerpoint/2010/main" val="410347548"/>
       </p:ext>
     </p:extLst>
   </p:cSld>
@@ -5723,7 +7177,13 @@
       </p:grpSpPr>
       <p:sp>
         <p:nvSpPr>
-          <p:cNvPr id="2" name="Nadpis 1"/>
+          <p:cNvPr id="2" name="Nadpis 1">
+            <a:extLst>
+              <a:ext uri="{FF2B5EF4-FFF2-40B4-BE49-F238E27FC236}">
+                <a16:creationId xmlns:a16="http://schemas.microsoft.com/office/drawing/2014/main" id="{1DE78E3F-FA6F-430C-8AE4-324C7DF2457E}"/>
+              </a:ext>
+            </a:extLst>
+          </p:cNvPr>
           <p:cNvSpPr>
             <a:spLocks noGrp="1"/>
           </p:cNvSpPr>
@@ -5738,14 +7198,20 @@
           <a:p>
             <a:r>
               <a:rPr lang="cs-CZ" dirty="0"/>
-              <a:t>Zhodnocení práce</a:t>
-            </a:r>
-          </a:p>
-        </p:txBody>
-      </p:sp>
-      <p:sp>
-        <p:nvSpPr>
-          <p:cNvPr id="3" name="Zástupný symbol pro obsah 2"/>
+              <a:t>Představení aplikace</a:t>
+            </a:r>
+          </a:p>
+        </p:txBody>
+      </p:sp>
+      <p:sp>
+        <p:nvSpPr>
+          <p:cNvPr id="3" name="Zástupný obsah 2">
+            <a:extLst>
+              <a:ext uri="{FF2B5EF4-FFF2-40B4-BE49-F238E27FC236}">
+                <a16:creationId xmlns:a16="http://schemas.microsoft.com/office/drawing/2014/main" id="{C0116903-3981-4ECF-AD59-4DF615A0E3D5}"/>
+              </a:ext>
+            </a:extLst>
+          </p:cNvPr>
           <p:cNvSpPr>
             <a:spLocks noGrp="1"/>
           </p:cNvSpPr>
@@ -5759,21 +7225,21 @@
           <a:lstStyle/>
           <a:p>
             <a:r>
-              <a:rPr lang="cs-CZ" sz="2800" dirty="0"/>
-              <a:t>Rozdíly BP/DP</a:t>
-            </a:r>
-          </a:p>
-          <a:p>
-            <a:r>
-              <a:rPr lang="cs-CZ" sz="2800" dirty="0"/>
-              <a:t>Měření výsledků</a:t>
-            </a:r>
-          </a:p>
-        </p:txBody>
-      </p:sp>
-      <p:sp>
-        <p:nvSpPr>
-          <p:cNvPr id="4" name="Zástupný symbol pro číslo snímku 3"/>
+              <a:rPr lang="cs-CZ" dirty="0"/>
+              <a:t>Režim testování</a:t>
+            </a:r>
+          </a:p>
+        </p:txBody>
+      </p:sp>
+      <p:sp>
+        <p:nvSpPr>
+          <p:cNvPr id="4" name="Zástupný symbol pro číslo snímku 3">
+            <a:extLst>
+              <a:ext uri="{FF2B5EF4-FFF2-40B4-BE49-F238E27FC236}">
+                <a16:creationId xmlns:a16="http://schemas.microsoft.com/office/drawing/2014/main" id="{8C2ACB18-4037-44D2-BD6A-3535A32F0DC4}"/>
+              </a:ext>
+            </a:extLst>
+          </p:cNvPr>
           <p:cNvSpPr>
             <a:spLocks noGrp="1"/>
           </p:cNvSpPr>
@@ -5800,45 +7266,40 @@
           </a:p>
         </p:txBody>
       </p:sp>
-      <p:sp>
-        <p:nvSpPr>
-          <p:cNvPr id="5" name="TextovéPole 4">
+      <p:pic>
+        <p:nvPicPr>
+          <p:cNvPr id="6" name="Obrázek 5">
             <a:extLst>
               <a:ext uri="{FF2B5EF4-FFF2-40B4-BE49-F238E27FC236}">
-                <a16:creationId xmlns:a16="http://schemas.microsoft.com/office/drawing/2014/main" id="{8258C19C-9516-4846-BC9A-AEC9219A339B}"/>
+                <a16:creationId xmlns:a16="http://schemas.microsoft.com/office/drawing/2014/main" id="{42223B44-46F6-4F17-BAB3-45829E509817}"/>
               </a:ext>
             </a:extLst>
           </p:cNvPr>
-          <p:cNvSpPr txBox="1"/>
+          <p:cNvPicPr>
+            <a:picLocks noChangeAspect="1"/>
+          </p:cNvPicPr>
           <p:nvPr/>
-        </p:nvSpPr>
+        </p:nvPicPr>
+        <p:blipFill>
+          <a:blip r:embed="rId2"/>
+          <a:stretch>
+            <a:fillRect/>
+          </a:stretch>
+        </p:blipFill>
         <p:spPr>
           <a:xfrm>
-            <a:off x="3635896" y="3140968"/>
-            <a:ext cx="2646109" cy="369332"/>
+            <a:off x="899592" y="2276872"/>
+            <a:ext cx="5328592" cy="3716755"/>
           </a:xfrm>
           <a:prstGeom prst="rect">
             <a:avLst/>
           </a:prstGeom>
-          <a:noFill/>
         </p:spPr>
-        <p:txBody>
-          <a:bodyPr wrap="none" rtlCol="0">
-            <a:spAutoFit/>
-          </a:bodyPr>
-          <a:lstStyle/>
-          <a:p>
-            <a:r>
-              <a:rPr lang="cs-CZ" dirty="0"/>
-              <a:t>Grafy naměřených hodnot</a:t>
-            </a:r>
-          </a:p>
-        </p:txBody>
-      </p:sp>
+      </p:pic>
     </p:spTree>
     <p:extLst>
       <p:ext uri="{BB962C8B-B14F-4D97-AF65-F5344CB8AC3E}">
-        <p14:creationId xmlns:p14="http://schemas.microsoft.com/office/powerpoint/2010/main" val="243088555"/>
+        <p14:creationId xmlns:p14="http://schemas.microsoft.com/office/powerpoint/2010/main" val="4155715251"/>
       </p:ext>
     </p:extLst>
   </p:cSld>
@@ -5867,7 +7328,13 @@
       </p:grpSpPr>
       <p:sp>
         <p:nvSpPr>
-          <p:cNvPr id="2" name="Nadpis 1"/>
+          <p:cNvPr id="2" name="Nadpis 1">
+            <a:extLst>
+              <a:ext uri="{FF2B5EF4-FFF2-40B4-BE49-F238E27FC236}">
+                <a16:creationId xmlns:a16="http://schemas.microsoft.com/office/drawing/2014/main" id="{7E365AB1-1FF1-4F26-8FC9-5A6847B41C9F}"/>
+              </a:ext>
+            </a:extLst>
+          </p:cNvPr>
           <p:cNvSpPr>
             <a:spLocks noGrp="1"/>
           </p:cNvSpPr>
@@ -5882,14 +7349,20 @@
           <a:p>
             <a:r>
               <a:rPr lang="cs-CZ" dirty="0"/>
-              <a:t>Zhodnocení práce</a:t>
-            </a:r>
-          </a:p>
-        </p:txBody>
-      </p:sp>
-      <p:sp>
-        <p:nvSpPr>
-          <p:cNvPr id="3" name="Zástupný symbol pro obsah 2"/>
+              <a:t>Představení aplikace</a:t>
+            </a:r>
+          </a:p>
+        </p:txBody>
+      </p:sp>
+      <p:sp>
+        <p:nvSpPr>
+          <p:cNvPr id="3" name="Zástupný obsah 2">
+            <a:extLst>
+              <a:ext uri="{FF2B5EF4-FFF2-40B4-BE49-F238E27FC236}">
+                <a16:creationId xmlns:a16="http://schemas.microsoft.com/office/drawing/2014/main" id="{05770B99-2F33-4A80-9DBC-DA2407AA9671}"/>
+              </a:ext>
+            </a:extLst>
+          </p:cNvPr>
           <p:cNvSpPr>
             <a:spLocks noGrp="1"/>
           </p:cNvSpPr>
@@ -5903,62 +7376,67 @@
           <a:lstStyle/>
           <a:p>
             <a:r>
-              <a:rPr lang="cs-CZ" sz="2800" dirty="0"/>
-              <a:t>Splnění cílů</a:t>
+              <a:rPr lang="cs-CZ" dirty="0"/>
+              <a:t>Rozšíření oproti BP</a:t>
             </a:r>
           </a:p>
           <a:p>
             <a:pPr lvl="1"/>
             <a:r>
-              <a:rPr lang="cs-CZ" sz="2400" dirty="0"/>
-              <a:t>Použití fuzzy logiky</a:t>
+              <a:rPr lang="cs-CZ" dirty="0"/>
+              <a:t>Implementace fuzzy logiky</a:t>
             </a:r>
           </a:p>
           <a:p>
             <a:pPr lvl="1"/>
             <a:r>
-              <a:rPr lang="cs-CZ" sz="2400" dirty="0"/>
-              <a:t>Rozšíření BP</a:t>
-            </a:r>
-          </a:p>
-          <a:p>
-            <a:r>
-              <a:rPr lang="cs-CZ" sz="2800" dirty="0"/>
-              <a:t>Silné stránky aplikace</a:t>
+              <a:rPr lang="cs-CZ" dirty="0"/>
+              <a:t>Nové funkce aplikace</a:t>
+            </a:r>
+          </a:p>
+          <a:p>
+            <a:pPr lvl="2"/>
+            <a:r>
+              <a:rPr lang="cs-CZ" dirty="0"/>
+              <a:t>Vyhlazení silnic</a:t>
+            </a:r>
+          </a:p>
+          <a:p>
+            <a:pPr lvl="2"/>
+            <a:r>
+              <a:rPr lang="cs-CZ" dirty="0"/>
+              <a:t>Nastavení hustoty provozu</a:t>
+            </a:r>
+          </a:p>
+          <a:p>
+            <a:pPr lvl="2"/>
+            <a:r>
+              <a:rPr lang="cs-CZ" dirty="0"/>
+              <a:t>Vypnutí/zapnutí semaforů</a:t>
+            </a:r>
+          </a:p>
+          <a:p>
+            <a:pPr lvl="2"/>
+            <a:r>
+              <a:rPr lang="cs-CZ" dirty="0"/>
+              <a:t>Detekce souběžných silnic</a:t>
             </a:r>
           </a:p>
           <a:p>
             <a:pPr lvl="1"/>
-            <a:r>
-              <a:rPr lang="cs-CZ" sz="2400" dirty="0"/>
-              <a:t>Plynulý pohyb</a:t>
-            </a:r>
-          </a:p>
-          <a:p>
-            <a:pPr lvl="1"/>
-            <a:r>
-              <a:rPr lang="cs-CZ" sz="2400" dirty="0"/>
-              <a:t>Funkčnost aplikace</a:t>
-            </a:r>
-          </a:p>
-          <a:p>
-            <a:r>
-              <a:rPr lang="cs-CZ" sz="2800" dirty="0"/>
-              <a:t>Slabé stránky</a:t>
-            </a:r>
-          </a:p>
-          <a:p>
-            <a:pPr lvl="1"/>
-            <a:r>
-              <a:rPr lang="cs-CZ" sz="2400" dirty="0"/>
-              <a:t>Systémová náročnost</a:t>
-            </a:r>
-          </a:p>
-        </p:txBody>
-      </p:sp>
-      <p:sp>
-        <p:nvSpPr>
-          <p:cNvPr id="4" name="Zástupný symbol pro číslo snímku 3"/>
+            <a:endParaRPr lang="cs-CZ" dirty="0"/>
+          </a:p>
+        </p:txBody>
+      </p:sp>
+      <p:sp>
+        <p:nvSpPr>
+          <p:cNvPr id="4" name="Zástupný symbol pro číslo snímku 3">
+            <a:extLst>
+              <a:ext uri="{FF2B5EF4-FFF2-40B4-BE49-F238E27FC236}">
+                <a16:creationId xmlns:a16="http://schemas.microsoft.com/office/drawing/2014/main" id="{E9CAD550-16DD-487A-9C52-57B6AE70DD81}"/>
+              </a:ext>
+            </a:extLst>
+          </p:cNvPr>
           <p:cNvSpPr>
             <a:spLocks noGrp="1"/>
           </p:cNvSpPr>
@@ -5988,7 +7466,7 @@
     </p:spTree>
     <p:extLst>
       <p:ext uri="{BB962C8B-B14F-4D97-AF65-F5344CB8AC3E}">
-        <p14:creationId xmlns:p14="http://schemas.microsoft.com/office/powerpoint/2010/main" val="4253892387"/>
+        <p14:creationId xmlns:p14="http://schemas.microsoft.com/office/powerpoint/2010/main" val="4105039192"/>
       </p:ext>
     </p:extLst>
   </p:cSld>

</xml_diff>